<commit_message>
new: power point intermediate backend
</commit_message>
<xml_diff>
--- a/Week6-IntermediateBackend.pptx
+++ b/Week6-IntermediateBackend.pptx
@@ -15,6 +15,7 @@
     <p:sldId id="278" r:id="rId9"/>
     <p:sldId id="280" r:id="rId10"/>
     <p:sldId id="279" r:id="rId11"/>
+    <p:sldId id="281" r:id="rId12"/>
   </p:sldIdLst>
   <p:sldSz cx="12192000" cy="6858000"/>
   <p:notesSz cx="6858000" cy="9144000"/>
@@ -6163,11 +6164,7 @@
           <a:p>
             <a:r>
               <a:rPr lang="en-US" dirty="0" smtClean="0"/>
-              <a:t>Week 6 </a:t>
-            </a:r>
-            <a:r>
-              <a:rPr lang="en-US" dirty="0" smtClean="0"/>
-              <a:t>– Intermediate Backend</a:t>
+              <a:t>Week 6 – Intermediate Backend</a:t>
             </a:r>
             <a:endParaRPr lang="en-US" dirty="0"/>
           </a:p>
@@ -6685,6 +6682,91 @@
 </p:sld>
 </file>
 
+<file path=ppt/slides/slide11.xml><?xml version="1.0" encoding="utf-8"?>
+<p:sld xmlns:a="http://schemas.openxmlformats.org/drawingml/2006/main" xmlns:r="http://schemas.openxmlformats.org/officeDocument/2006/relationships" xmlns:p="http://schemas.openxmlformats.org/presentationml/2006/main">
+  <p:cSld>
+    <p:spTree>
+      <p:nvGrpSpPr>
+        <p:cNvPr id="1" name=""/>
+        <p:cNvGrpSpPr/>
+        <p:nvPr/>
+      </p:nvGrpSpPr>
+      <p:grpSpPr>
+        <a:xfrm>
+          <a:off x="0" y="0"/>
+          <a:ext cx="0" cy="0"/>
+          <a:chOff x="0" y="0"/>
+          <a:chExt cx="0" cy="0"/>
+        </a:xfrm>
+      </p:grpSpPr>
+      <p:sp>
+        <p:nvSpPr>
+          <p:cNvPr id="2" name="Title 1"/>
+          <p:cNvSpPr>
+            <a:spLocks noGrp="1"/>
+          </p:cNvSpPr>
+          <p:nvPr>
+            <p:ph type="title"/>
+          </p:nvPr>
+        </p:nvSpPr>
+        <p:spPr>
+          <a:xfrm>
+            <a:off x="1484311" y="2337179"/>
+            <a:ext cx="10018713" cy="1752599"/>
+          </a:xfrm>
+        </p:spPr>
+        <p:txBody>
+          <a:bodyPr/>
+          <a:lstStyle/>
+          <a:p>
+            <a:r>
+              <a:rPr lang="en-US" dirty="0" err="1" smtClean="0"/>
+              <a:t>Sekian</a:t>
+            </a:r>
+            <a:r>
+              <a:rPr lang="en-US" dirty="0" smtClean="0"/>
+              <a:t> </a:t>
+            </a:r>
+            <a:r>
+              <a:rPr lang="en-US" dirty="0" err="1" smtClean="0"/>
+              <a:t>dan</a:t>
+            </a:r>
+            <a:r>
+              <a:rPr lang="en-US" dirty="0" smtClean="0"/>
+              <a:t/>
+            </a:r>
+            <a:br>
+              <a:rPr lang="en-US" dirty="0" smtClean="0"/>
+            </a:br>
+            <a:r>
+              <a:rPr lang="en-US" dirty="0" err="1" smtClean="0"/>
+              <a:t>Terima</a:t>
+            </a:r>
+            <a:r>
+              <a:rPr lang="en-US" dirty="0" smtClean="0"/>
+              <a:t> </a:t>
+            </a:r>
+            <a:r>
+              <a:rPr lang="en-US" dirty="0" err="1" smtClean="0"/>
+              <a:t>Kasih</a:t>
+            </a:r>
+            <a:endParaRPr lang="en-US" dirty="0"/>
+          </a:p>
+        </p:txBody>
+      </p:sp>
+    </p:spTree>
+    <p:extLst>
+      <p:ext uri="{BB962C8B-B14F-4D97-AF65-F5344CB8AC3E}">
+        <p14:creationId xmlns:p14="http://schemas.microsoft.com/office/powerpoint/2010/main" val="1514387777"/>
+      </p:ext>
+    </p:extLst>
+  </p:cSld>
+  <p:clrMapOvr>
+    <a:masterClrMapping/>
+  </p:clrMapOvr>
+</p:sld>
+</file>
+
 <file path=ppt/slides/slide2.xml><?xml version="1.0" encoding="utf-8"?>
 <p:sld xmlns:a="http://schemas.openxmlformats.org/drawingml/2006/main" xmlns:r="http://schemas.openxmlformats.org/officeDocument/2006/relationships" xmlns:p="http://schemas.openxmlformats.org/presentationml/2006/main">
   <p:cSld>
@@ -6980,8 +7062,8 @@
         </p:nvSpPr>
         <p:spPr>
           <a:xfrm>
-            <a:off x="1484310" y="2265528"/>
-            <a:ext cx="10018713" cy="2579427"/>
+            <a:off x="1484310" y="2265529"/>
+            <a:ext cx="10018713" cy="1419368"/>
           </a:xfrm>
           <a:prstGeom prst="rect">
             <a:avLst/>
@@ -7244,203 +7326,7 @@
             </a:r>
             <a:r>
               <a:rPr lang="en-US" sz="2000" dirty="0" smtClean="0"/>
-              <a:t> lain. </a:t>
-            </a:r>
-            <a:r>
-              <a:rPr lang="en-US" sz="2000" dirty="0" err="1" smtClean="0"/>
-              <a:t>Dalam</a:t>
-            </a:r>
-            <a:r>
-              <a:rPr lang="en-US" sz="2000" dirty="0" smtClean="0"/>
-              <a:t> proses </a:t>
-            </a:r>
-            <a:r>
-              <a:rPr lang="en-US" sz="2000" dirty="0" err="1" smtClean="0"/>
-              <a:t>otentikasi</a:t>
-            </a:r>
-            <a:r>
-              <a:rPr lang="en-US" sz="2000" dirty="0" smtClean="0"/>
-              <a:t>, </a:t>
-            </a:r>
-            <a:r>
-              <a:rPr lang="en-US" sz="2000" dirty="0" err="1" smtClean="0"/>
-              <a:t>identitas</a:t>
-            </a:r>
-            <a:r>
-              <a:rPr lang="en-US" sz="2000" dirty="0" smtClean="0"/>
-              <a:t> </a:t>
-            </a:r>
-            <a:r>
-              <a:rPr lang="en-US" sz="2000" dirty="0" err="1" smtClean="0"/>
-              <a:t>pengguna</a:t>
-            </a:r>
-            <a:r>
-              <a:rPr lang="en-US" sz="2000" dirty="0" smtClean="0"/>
-              <a:t> </a:t>
-            </a:r>
-            <a:r>
-              <a:rPr lang="en-US" sz="2000" dirty="0" err="1" smtClean="0"/>
-              <a:t>diperiksa</a:t>
-            </a:r>
-            <a:r>
-              <a:rPr lang="en-US" sz="2000" dirty="0" smtClean="0"/>
-              <a:t> </a:t>
-            </a:r>
-            <a:r>
-              <a:rPr lang="en-US" sz="2000" dirty="0" err="1" smtClean="0"/>
-              <a:t>untuk</a:t>
-            </a:r>
-            <a:r>
-              <a:rPr lang="en-US" sz="2000" dirty="0" smtClean="0"/>
-              <a:t> </a:t>
-            </a:r>
-            <a:r>
-              <a:rPr lang="en-US" sz="2000" dirty="0" err="1" smtClean="0"/>
-              <a:t>menyediakan</a:t>
-            </a:r>
-            <a:r>
-              <a:rPr lang="en-US" sz="2000" dirty="0" smtClean="0"/>
-              <a:t> </a:t>
-            </a:r>
-            <a:r>
-              <a:rPr lang="en-US" sz="2000" dirty="0" err="1" smtClean="0"/>
-              <a:t>akses</a:t>
-            </a:r>
-            <a:r>
-              <a:rPr lang="en-US" sz="2000" dirty="0" smtClean="0"/>
-              <a:t> </a:t>
-            </a:r>
-            <a:r>
-              <a:rPr lang="en-US" sz="2000" dirty="0" err="1" smtClean="0"/>
-              <a:t>ke</a:t>
-            </a:r>
-            <a:r>
-              <a:rPr lang="en-US" sz="2000" dirty="0" smtClean="0"/>
-              <a:t> </a:t>
-            </a:r>
-            <a:r>
-              <a:rPr lang="en-US" sz="2000" dirty="0" err="1" smtClean="0"/>
-              <a:t>dalam</a:t>
-            </a:r>
-            <a:r>
-              <a:rPr lang="en-US" sz="2000" dirty="0" smtClean="0"/>
-              <a:t> </a:t>
-            </a:r>
-            <a:r>
-              <a:rPr lang="en-US" sz="2000" dirty="0" err="1" smtClean="0"/>
-              <a:t>sistem</a:t>
-            </a:r>
-            <a:r>
-              <a:rPr lang="en-US" sz="2000" dirty="0" smtClean="0"/>
-              <a:t>. </a:t>
-            </a:r>
-            <a:r>
-              <a:rPr lang="en-US" sz="2000" dirty="0" err="1" smtClean="0"/>
-              <a:t>Sedangkan</a:t>
-            </a:r>
-            <a:r>
-              <a:rPr lang="en-US" sz="2000" dirty="0" smtClean="0"/>
-              <a:t> </a:t>
-            </a:r>
-            <a:r>
-              <a:rPr lang="en-US" sz="2000" dirty="0" err="1" smtClean="0"/>
-              <a:t>dalam</a:t>
-            </a:r>
-            <a:r>
-              <a:rPr lang="en-US" sz="2000" dirty="0" smtClean="0"/>
-              <a:t> proses </a:t>
-            </a:r>
-            <a:r>
-              <a:rPr lang="en-US" sz="2000" dirty="0" err="1" smtClean="0"/>
-              <a:t>otorisasi</a:t>
-            </a:r>
-            <a:r>
-              <a:rPr lang="en-US" sz="2000" dirty="0" smtClean="0"/>
-              <a:t>, </a:t>
-            </a:r>
-            <a:r>
-              <a:rPr lang="en-US" sz="2000" dirty="0" err="1" smtClean="0"/>
-              <a:t>otoritas</a:t>
-            </a:r>
-            <a:r>
-              <a:rPr lang="en-US" sz="2000" dirty="0" smtClean="0"/>
-              <a:t> </a:t>
-            </a:r>
-            <a:r>
-              <a:rPr lang="en-US" sz="2000" dirty="0" err="1" smtClean="0"/>
-              <a:t>pengguna</a:t>
-            </a:r>
-            <a:r>
-              <a:rPr lang="en-US" sz="2000" dirty="0" smtClean="0"/>
-              <a:t> </a:t>
-            </a:r>
-            <a:r>
-              <a:rPr lang="en-US" sz="2000" dirty="0" err="1" smtClean="0"/>
-              <a:t>untuk</a:t>
-            </a:r>
-            <a:r>
-              <a:rPr lang="en-US" sz="2000" dirty="0" smtClean="0"/>
-              <a:t> </a:t>
-            </a:r>
-            <a:r>
-              <a:rPr lang="en-US" sz="2000" dirty="0" err="1" smtClean="0"/>
-              <a:t>mengakses</a:t>
-            </a:r>
-            <a:r>
-              <a:rPr lang="en-US" sz="2000" dirty="0" smtClean="0"/>
-              <a:t> resource </a:t>
-            </a:r>
-            <a:r>
-              <a:rPr lang="en-US" sz="2000" dirty="0" err="1" smtClean="0"/>
-              <a:t>atau</a:t>
-            </a:r>
-            <a:r>
-              <a:rPr lang="en-US" sz="2000" dirty="0" smtClean="0"/>
-              <a:t> </a:t>
-            </a:r>
-            <a:r>
-              <a:rPr lang="en-US" sz="2000" dirty="0" err="1" smtClean="0"/>
-              <a:t>sumber</a:t>
-            </a:r>
-            <a:r>
-              <a:rPr lang="en-US" sz="2000" dirty="0" smtClean="0"/>
-              <a:t> </a:t>
-            </a:r>
-            <a:r>
-              <a:rPr lang="en-US" sz="2000" dirty="0" err="1" smtClean="0"/>
-              <a:t>daya</a:t>
-            </a:r>
-            <a:r>
-              <a:rPr lang="en-US" sz="2000" dirty="0" smtClean="0"/>
-              <a:t>. </a:t>
-            </a:r>
-            <a:r>
-              <a:rPr lang="en-US" sz="2000" dirty="0" err="1" smtClean="0"/>
-              <a:t>Otentikasi</a:t>
-            </a:r>
-            <a:r>
-              <a:rPr lang="en-US" sz="2000" dirty="0" smtClean="0"/>
-              <a:t> </a:t>
-            </a:r>
-            <a:r>
-              <a:rPr lang="en-US" sz="2000" dirty="0" err="1" smtClean="0"/>
-              <a:t>dilakukan</a:t>
-            </a:r>
-            <a:r>
-              <a:rPr lang="en-US" sz="2000" dirty="0" smtClean="0"/>
-              <a:t> </a:t>
-            </a:r>
-            <a:r>
-              <a:rPr lang="en-US" sz="2000" dirty="0" err="1" smtClean="0"/>
-              <a:t>sebelum</a:t>
-            </a:r>
-            <a:r>
-              <a:rPr lang="en-US" sz="2000" dirty="0" smtClean="0"/>
-              <a:t> proses </a:t>
-            </a:r>
-            <a:r>
-              <a:rPr lang="en-US" sz="2000" dirty="0" err="1" smtClean="0"/>
-              <a:t>otorisasi</a:t>
+              <a:t> lain</a:t>
             </a:r>
             <a:r>
               <a:rPr lang="en-US" sz="2000" dirty="0" smtClean="0"/>
@@ -8574,6 +8460,30 @@
           </a:p>
         </p:txBody>
       </p:sp>
+      <p:pic>
+        <p:nvPicPr>
+          <p:cNvPr id="3" name="Picture 2"/>
+          <p:cNvPicPr>
+            <a:picLocks noChangeAspect="1"/>
+          </p:cNvPicPr>
+          <p:nvPr/>
+        </p:nvPicPr>
+        <p:blipFill>
+          <a:blip r:embed="rId2"/>
+          <a:stretch>
+            <a:fillRect/>
+          </a:stretch>
+        </p:blipFill>
+        <p:spPr>
+          <a:xfrm>
+            <a:off x="2090477" y="3739487"/>
+            <a:ext cx="8381089" cy="1883391"/>
+          </a:xfrm>
+          <a:prstGeom prst="rect">
+            <a:avLst/>
+          </a:prstGeom>
+        </p:spPr>
+      </p:pic>
     </p:spTree>
     <p:extLst>
       <p:ext uri="{BB962C8B-B14F-4D97-AF65-F5344CB8AC3E}">
@@ -9153,8 +9063,8 @@
         </p:nvSpPr>
         <p:spPr>
           <a:xfrm>
-            <a:off x="1484310" y="2265528"/>
-            <a:ext cx="10018713" cy="1678675"/>
+            <a:off x="1484310" y="2265529"/>
+            <a:ext cx="10018713" cy="1296538"/>
           </a:xfrm>
           <a:prstGeom prst="rect">
             <a:avLst/>
@@ -9381,123 +9291,7 @@
             </a:r>
             <a:r>
               <a:rPr lang="en-US" sz="2000" dirty="0" smtClean="0"/>
-              <a:t> lain. </a:t>
-            </a:r>
-            <a:r>
-              <a:rPr lang="en-US" sz="2000" dirty="0" err="1" smtClean="0"/>
-              <a:t>Jadi</a:t>
-            </a:r>
-            <a:r>
-              <a:rPr lang="en-US" sz="2000" dirty="0" smtClean="0"/>
-              <a:t> </a:t>
-            </a:r>
-            <a:r>
-              <a:rPr lang="en-US" sz="2000" dirty="0" err="1" smtClean="0"/>
-              <a:t>pada</a:t>
-            </a:r>
-            <a:r>
-              <a:rPr lang="en-US" sz="2000" dirty="0" smtClean="0"/>
-              <a:t> </a:t>
-            </a:r>
-            <a:r>
-              <a:rPr lang="en-US" sz="2000" dirty="0" err="1" smtClean="0"/>
-              <a:t>intinya</a:t>
-            </a:r>
-            <a:r>
-              <a:rPr lang="en-US" sz="2000" dirty="0"/>
-              <a:t> </a:t>
-            </a:r>
-            <a:r>
-              <a:rPr lang="en-US" sz="2000" dirty="0" err="1" smtClean="0"/>
-              <a:t>kita</a:t>
-            </a:r>
-            <a:r>
-              <a:rPr lang="en-US" sz="2000" dirty="0" smtClean="0"/>
-              <a:t> </a:t>
-            </a:r>
-            <a:r>
-              <a:rPr lang="en-US" sz="2000" dirty="0" err="1" smtClean="0"/>
-              <a:t>bisa</a:t>
-            </a:r>
-            <a:r>
-              <a:rPr lang="en-US" sz="2000" dirty="0" smtClean="0"/>
-              <a:t> transfer data </a:t>
-            </a:r>
-            <a:r>
-              <a:rPr lang="en-US" sz="2000" dirty="0" err="1" smtClean="0"/>
-              <a:t>antara</a:t>
-            </a:r>
-            <a:r>
-              <a:rPr lang="en-US" sz="2000" dirty="0" smtClean="0"/>
-              <a:t> domain. </a:t>
-            </a:r>
-            <a:r>
-              <a:rPr lang="en-US" sz="2000" dirty="0" err="1" smtClean="0"/>
-              <a:t>Metode</a:t>
-            </a:r>
-            <a:r>
-              <a:rPr lang="en-US" sz="2000" dirty="0" smtClean="0"/>
-              <a:t> </a:t>
-            </a:r>
-            <a:r>
-              <a:rPr lang="en-US" sz="2000" dirty="0" err="1" smtClean="0"/>
-              <a:t>ini</a:t>
-            </a:r>
-            <a:r>
-              <a:rPr lang="en-US" sz="2000" dirty="0" smtClean="0"/>
-              <a:t> </a:t>
-            </a:r>
-            <a:r>
-              <a:rPr lang="en-US" sz="2000" dirty="0" err="1" smtClean="0"/>
-              <a:t>mirip</a:t>
-            </a:r>
-            <a:r>
-              <a:rPr lang="en-US" sz="2000" dirty="0" smtClean="0"/>
-              <a:t> </a:t>
-            </a:r>
-            <a:r>
-              <a:rPr lang="en-US" sz="2000" dirty="0" err="1" smtClean="0"/>
-              <a:t>seperti</a:t>
-            </a:r>
-            <a:r>
-              <a:rPr lang="en-US" sz="2000" dirty="0" smtClean="0"/>
-              <a:t> API, </a:t>
-            </a:r>
-            <a:r>
-              <a:rPr lang="en-US" sz="2000" dirty="0" err="1" smtClean="0"/>
-              <a:t>kita</a:t>
-            </a:r>
-            <a:r>
-              <a:rPr lang="en-US" sz="2000" dirty="0" smtClean="0"/>
-              <a:t> </a:t>
-            </a:r>
-            <a:r>
-              <a:rPr lang="en-US" sz="2000" dirty="0" err="1" smtClean="0"/>
-              <a:t>bisa</a:t>
-            </a:r>
-            <a:r>
-              <a:rPr lang="en-US" sz="2000" dirty="0" smtClean="0"/>
-              <a:t> </a:t>
-            </a:r>
-            <a:r>
-              <a:rPr lang="en-US" sz="2000" dirty="0" err="1" smtClean="0"/>
-              <a:t>menggunakan</a:t>
-            </a:r>
-            <a:r>
-              <a:rPr lang="en-US" sz="2000" dirty="0" smtClean="0"/>
-              <a:t> JSON </a:t>
-            </a:r>
-            <a:r>
-              <a:rPr lang="en-US" sz="2000" dirty="0" err="1" smtClean="0"/>
-              <a:t>sebagai</a:t>
-            </a:r>
-            <a:r>
-              <a:rPr lang="en-US" sz="2000" dirty="0" smtClean="0"/>
-              <a:t> </a:t>
-            </a:r>
-            <a:r>
-              <a:rPr lang="en-US" sz="2000" dirty="0" err="1" smtClean="0"/>
-              <a:t>servicenya</a:t>
+              <a:t> lain</a:t>
             </a:r>
             <a:r>
               <a:rPr lang="en-US" sz="2000" dirty="0" smtClean="0"/>

</xml_diff>